<commit_message>
fix typo in README; add secert on GitHub and reference in .yml test part
</commit_message>
<xml_diff>
--- a/pictures/Roadmap.pptx
+++ b/pictures/Roadmap.pptx
@@ -3442,19 +3442,7 @@
                   </a:schemeClr>
                 </a:solidFill>
               </a:rPr>
-              <a:t>Open, High, Low, Close, Adj Close,</a:t>
-            </a:r>
-            <a:r>
-              <a:rPr lang="en-US" altLang="zh-CN" dirty="0"/>
-              <a:t> </a:t>
-            </a:r>
-            <a:r>
-              <a:rPr lang="en-US" altLang="zh-CN" dirty="0">
-                <a:solidFill>
-                  <a:schemeClr val="accent3"/>
-                </a:solidFill>
-              </a:rPr>
-              <a:t>Volume</a:t>
+              <a:t>Open, High, Low, Close, Adj Close</a:t>
             </a:r>
             <a:r>
               <a:rPr lang="en-US" altLang="zh-CN" dirty="0"/>

</xml_diff>